<commit_message>
started to write ReadMe
</commit_message>
<xml_diff>
--- a/presentation_mod_3.pptx
+++ b/presentation_mod_3.pptx
@@ -12,6 +12,7 @@
     <p:sldId id="260" r:id="rId6"/>
     <p:sldId id="261" r:id="rId7"/>
     <p:sldId id="262" r:id="rId8"/>
+    <p:sldId id="263" r:id="rId9"/>
   </p:sldIdLst>
   <p:sldSz cx="12192000" cy="6858000"/>
   <p:notesSz cx="6858000" cy="9144000"/>
@@ -110,6 +111,11 @@
       </a:defRPr>
     </a:lvl9pPr>
   </p:defaultTextStyle>
+  <p:extLst>
+    <p:ext uri="{EFAFB233-063F-42B5-8137-9DF3F51BA10A}">
+      <p15:sldGuideLst xmlns:p15="http://schemas.microsoft.com/office/powerpoint/2012/main"/>
+    </p:ext>
+  </p:extLst>
 </p:presentation>
 </file>
 
@@ -3643,7 +3649,7 @@
           <a:p>
             <a:fld id="{9AB3A824-1A51-4B26-AD58-A6D8E14F6C04}" type="datetimeFigureOut">
               <a:rPr lang="en-US" dirty="0"/>
-              <a:t>7/15/19</a:t>
+              <a:t>7/16/19</a:t>
             </a:fld>
             <a:endParaRPr lang="en-US" dirty="0"/>
           </a:p>
@@ -3977,7 +3983,7 @@
           <a:p>
             <a:fld id="{D857E33E-8B18-4087-B112-809917729534}" type="datetimeFigureOut">
               <a:rPr lang="en-US" dirty="0"/>
-              <a:t>7/15/19</a:t>
+              <a:t>7/16/19</a:t>
             </a:fld>
             <a:endParaRPr lang="en-US" dirty="0"/>
           </a:p>
@@ -4279,7 +4285,7 @@
           <a:p>
             <a:fld id="{D3FFE419-2371-464F-8239-3959401C3561}" type="datetimeFigureOut">
               <a:rPr lang="en-US" dirty="0"/>
-              <a:t>7/15/19</a:t>
+              <a:t>7/16/19</a:t>
             </a:fld>
             <a:endParaRPr lang="en-US" dirty="0"/>
           </a:p>
@@ -4526,7 +4532,7 @@
           <a:p>
             <a:fld id="{97D162C4-EDD9-4389-A98B-B87ECEA2A816}" type="datetimeFigureOut">
               <a:rPr lang="en-US" dirty="0"/>
-              <a:t>7/15/19</a:t>
+              <a:t>7/16/19</a:t>
             </a:fld>
             <a:endParaRPr lang="en-US" dirty="0"/>
           </a:p>
@@ -4933,7 +4939,7 @@
           <a:p>
             <a:fld id="{3E5059C3-6A89-4494-99FF-5A4D6FFD50EB}" type="datetimeFigureOut">
               <a:rPr lang="en-US" dirty="0"/>
-              <a:t>7/15/19</a:t>
+              <a:t>7/16/19</a:t>
             </a:fld>
             <a:endParaRPr lang="en-US" dirty="0"/>
           </a:p>
@@ -5247,7 +5253,7 @@
           <a:p>
             <a:fld id="{CA954B2F-12DE-47F5-8894-472B206D2E1E}" type="datetimeFigureOut">
               <a:rPr lang="en-US" dirty="0"/>
-              <a:t>7/15/19</a:t>
+              <a:t>7/16/19</a:t>
             </a:fld>
             <a:endParaRPr lang="en-US" dirty="0"/>
           </a:p>
@@ -5791,7 +5797,7 @@
           <a:p>
             <a:fld id="{3F30E46F-7819-4ACF-B48B-48222C2ACC88}" type="datetimeFigureOut">
               <a:rPr lang="en-US" dirty="0"/>
-              <a:t>7/15/19</a:t>
+              <a:t>7/16/19</a:t>
             </a:fld>
             <a:endParaRPr lang="en-US" dirty="0"/>
           </a:p>
@@ -5986,7 +5992,7 @@
           <a:p>
             <a:fld id="{1FAF3416-4057-4DAA-829D-4CA07428D088}" type="datetimeFigureOut">
               <a:rPr lang="en-US" dirty="0"/>
-              <a:t>7/15/19</a:t>
+              <a:t>7/16/19</a:t>
             </a:fld>
             <a:endParaRPr lang="en-US" dirty="0"/>
           </a:p>
@@ -6199,7 +6205,7 @@
           <a:p>
             <a:fld id="{921D9284-D300-4297-87F7-E791DCC15DB1}" type="datetimeFigureOut">
               <a:rPr lang="en-US" dirty="0"/>
-              <a:t>7/15/19</a:t>
+              <a:t>7/16/19</a:t>
             </a:fld>
             <a:endParaRPr lang="en-US" dirty="0"/>
           </a:p>
@@ -6568,7 +6574,7 @@
           <a:p>
             <a:fld id="{37D525BB-DA17-4BA0-B3C8-3AC3ABC827E6}" type="datetimeFigureOut">
               <a:rPr lang="en-US" dirty="0"/>
-              <a:t>7/15/19</a:t>
+              <a:t>7/16/19</a:t>
             </a:fld>
             <a:endParaRPr lang="en-US" dirty="0"/>
           </a:p>
@@ -6971,7 +6977,7 @@
           <a:p>
             <a:fld id="{B16C4C9A-3960-41CF-A4E9-2A8FB932454B}" type="datetimeFigureOut">
               <a:rPr lang="en-US" dirty="0"/>
-              <a:t>7/15/19</a:t>
+              <a:t>7/16/19</a:t>
             </a:fld>
             <a:endParaRPr lang="en-US" dirty="0"/>
           </a:p>
@@ -7282,7 +7288,7 @@
           <a:p>
             <a:fld id="{3CBC1C18-307B-4F68-A007-B5B542270E8D}" type="datetimeFigureOut">
               <a:rPr lang="en-US" dirty="0"/>
-              <a:t>7/15/19</a:t>
+              <a:t>7/16/19</a:t>
             </a:fld>
             <a:endParaRPr lang="en-US" dirty="0"/>
           </a:p>
@@ -8596,7 +8602,9 @@
           <a:lstStyle/>
           <a:p>
             <a:r>
-              <a:rPr lang="en-US" dirty="0"/>
+              <a:rPr lang="en-US" dirty="0">
+                <a:latin typeface="Calisto MT" panose="02040603050505030304" pitchFamily="18" charset="77"/>
+              </a:rPr>
               <a:t>Differences in Crime: Low Income v. High Income Neighborhoods</a:t>
             </a:r>
           </a:p>
@@ -8623,7 +8631,9 @@
           <a:bodyPr/>
           <a:lstStyle/>
           <a:p>
-            <a:endParaRPr lang="en-US"/>
+            <a:endParaRPr lang="en-US">
+              <a:latin typeface="Calisto MT" panose="02040603050505030304" pitchFamily="18" charset="77"/>
+            </a:endParaRPr>
           </a:p>
         </p:txBody>
       </p:sp>
@@ -8643,6 +8653,15 @@
 <file path=ppt/slides/slide6.xml><?xml version="1.0" encoding="utf-8"?>
 <p:sld xmlns:a="http://schemas.openxmlformats.org/drawingml/2006/main" xmlns:r="http://schemas.openxmlformats.org/officeDocument/2006/relationships" xmlns:p="http://schemas.openxmlformats.org/presentationml/2006/main">
   <p:cSld>
+    <p:bg>
+      <p:bgPr>
+        <a:blipFill rotWithShape="1">
+          <a:blip r:embed="rId2"/>
+          <a:stretch/>
+        </a:blipFill>
+        <a:effectLst/>
+      </p:bgPr>
+    </p:bg>
     <p:spTree>
       <p:nvGrpSpPr>
         <p:cNvPr id="1" name=""/>
@@ -8657,6 +8676,722 @@
           <a:chExt cx="0" cy="0"/>
         </a:xfrm>
       </p:grpSpPr>
+      <p:pic>
+        <p:nvPicPr>
+          <p:cNvPr id="12" name="Picture 11">
+            <a:extLst>
+              <a:ext uri="{FF2B5EF4-FFF2-40B4-BE49-F238E27FC236}">
+                <a16:creationId xmlns:a16="http://schemas.microsoft.com/office/drawing/2014/main" id="{26AA7C31-76FD-4B44-A1FF-D13D2515AE57}"/>
+              </a:ext>
+              <a:ext uri="{C183D7F6-B498-43B3-948B-1728B52AA6E4}">
+                <adec:decorative xmlns:adec="http://schemas.microsoft.com/office/drawing/2017/decorative" val="1"/>
+              </a:ext>
+            </a:extLst>
+          </p:cNvPr>
+          <p:cNvPicPr>
+            <a:picLocks noGrp="1" noRot="1" noChangeAspect="1" noMove="1" noResize="1" noEditPoints="1" noAdjustHandles="1" noChangeArrowheads="1" noChangeShapeType="1" noCrop="1"/>
+          </p:cNvPicPr>
+          <p:nvPr>
+            <p:extLst>
+              <p:ext uri="{386F3935-93C4-4BCD-93E2-E3B085C9AB24}">
+                <p16:designElem xmlns:p16="http://schemas.microsoft.com/office/powerpoint/2015/main" val="1"/>
+              </p:ext>
+            </p:extLst>
+          </p:nvPr>
+        </p:nvPicPr>
+        <p:blipFill>
+          <a:blip r:embed="rId3">
+            <a:extLst>
+              <a:ext uri="{28A0092B-C50C-407E-A947-70E740481C1C}">
+                <a14:useLocalDpi xmlns:a14="http://schemas.microsoft.com/office/drawing/2010/main" val="0"/>
+              </a:ext>
+            </a:extLst>
+          </a:blip>
+          <a:stretch>
+            <a:fillRect/>
+          </a:stretch>
+        </p:blipFill>
+        <p:spPr>
+          <a:xfrm>
+            <a:off x="2831794" y="2105202"/>
+            <a:ext cx="9360205" cy="4752798"/>
+          </a:xfrm>
+          <a:prstGeom prst="rect">
+            <a:avLst/>
+          </a:prstGeom>
+        </p:spPr>
+      </p:pic>
+      <p:pic>
+        <p:nvPicPr>
+          <p:cNvPr id="14" name="Picture 13">
+            <a:extLst>
+              <a:ext uri="{FF2B5EF4-FFF2-40B4-BE49-F238E27FC236}">
+                <a16:creationId xmlns:a16="http://schemas.microsoft.com/office/drawing/2014/main" id="{F5CE85F9-F4EE-4E5D-8235-528527A401D8}"/>
+              </a:ext>
+              <a:ext uri="{C183D7F6-B498-43B3-948B-1728B52AA6E4}">
+                <adec:decorative xmlns:adec="http://schemas.microsoft.com/office/drawing/2017/decorative" val="1"/>
+              </a:ext>
+            </a:extLst>
+          </p:cNvPr>
+          <p:cNvPicPr>
+            <a:picLocks noGrp="1" noRot="1" noChangeAspect="1" noMove="1" noResize="1" noEditPoints="1" noAdjustHandles="1" noChangeArrowheads="1" noChangeShapeType="1" noCrop="1"/>
+          </p:cNvPicPr>
+          <p:nvPr>
+            <p:extLst>
+              <p:ext uri="{386F3935-93C4-4BCD-93E2-E3B085C9AB24}">
+                <p16:designElem xmlns:p16="http://schemas.microsoft.com/office/powerpoint/2015/main" val="1"/>
+              </p:ext>
+            </p:extLst>
+          </p:nvPr>
+        </p:nvPicPr>
+        <p:blipFill>
+          <a:blip r:embed="rId4">
+            <a:extLst>
+              <a:ext uri="{28A0092B-C50C-407E-A947-70E740481C1C}">
+                <a14:useLocalDpi xmlns:a14="http://schemas.microsoft.com/office/drawing/2010/main" val="0"/>
+              </a:ext>
+            </a:extLst>
+          </a:blip>
+          <a:stretch>
+            <a:fillRect/>
+          </a:stretch>
+        </p:blipFill>
+        <p:spPr>
+          <a:xfrm>
+            <a:off x="0" y="0"/>
+            <a:ext cx="12189867" cy="6858000"/>
+          </a:xfrm>
+          <a:prstGeom prst="rect">
+            <a:avLst/>
+          </a:prstGeom>
+        </p:spPr>
+      </p:pic>
+      <p:sp>
+        <p:nvSpPr>
+          <p:cNvPr id="16" name="Rectangle 15">
+            <a:extLst>
+              <a:ext uri="{FF2B5EF4-FFF2-40B4-BE49-F238E27FC236}">
+                <a16:creationId xmlns:a16="http://schemas.microsoft.com/office/drawing/2014/main" id="{17338BB4-74FF-4836-86B7-F1B0C2B62DA9}"/>
+              </a:ext>
+              <a:ext uri="{C183D7F6-B498-43B3-948B-1728B52AA6E4}">
+                <adec:decorative xmlns:adec="http://schemas.microsoft.com/office/drawing/2017/decorative" val="1"/>
+              </a:ext>
+            </a:extLst>
+          </p:cNvPr>
+          <p:cNvSpPr>
+            <a:spLocks noGrp="1" noRot="1" noChangeAspect="1" noMove="1" noResize="1" noEditPoints="1" noAdjustHandles="1" noChangeArrowheads="1" noChangeShapeType="1" noTextEdit="1"/>
+          </p:cNvSpPr>
+          <p:nvPr>
+            <p:extLst>
+              <p:ext uri="{386F3935-93C4-4BCD-93E2-E3B085C9AB24}">
+                <p16:designElem xmlns:p16="http://schemas.microsoft.com/office/powerpoint/2015/main" val="1"/>
+              </p:ext>
+            </p:extLst>
+          </p:nvPr>
+        </p:nvSpPr>
+        <p:spPr>
+          <a:xfrm>
+            <a:off x="0" y="0"/>
+            <a:ext cx="964174" cy="6858000"/>
+          </a:xfrm>
+          <a:prstGeom prst="rect">
+            <a:avLst/>
+          </a:prstGeom>
+          <a:solidFill>
+            <a:schemeClr val="bg2"/>
+          </a:solidFill>
+          <a:ln>
+            <a:noFill/>
+          </a:ln>
+        </p:spPr>
+        <p:style>
+          <a:lnRef idx="2">
+            <a:schemeClr val="accent1">
+              <a:shade val="50000"/>
+            </a:schemeClr>
+          </a:lnRef>
+          <a:fillRef idx="1">
+            <a:schemeClr val="accent1"/>
+          </a:fillRef>
+          <a:effectRef idx="0">
+            <a:schemeClr val="accent1"/>
+          </a:effectRef>
+          <a:fontRef idx="minor">
+            <a:schemeClr val="lt1"/>
+          </a:fontRef>
+        </p:style>
+      </p:sp>
+      <p:sp>
+        <p:nvSpPr>
+          <p:cNvPr id="18" name="Rectangle 17">
+            <a:extLst>
+              <a:ext uri="{FF2B5EF4-FFF2-40B4-BE49-F238E27FC236}">
+                <a16:creationId xmlns:a16="http://schemas.microsoft.com/office/drawing/2014/main" id="{1ABFA8A3-A231-4BC1-B8A5-C5BE7315CD7D}"/>
+              </a:ext>
+              <a:ext uri="{C183D7F6-B498-43B3-948B-1728B52AA6E4}">
+                <adec:decorative xmlns:adec="http://schemas.microsoft.com/office/drawing/2017/decorative" val="1"/>
+              </a:ext>
+            </a:extLst>
+          </p:cNvPr>
+          <p:cNvSpPr>
+            <a:spLocks noGrp="1" noRot="1" noChangeAspect="1" noMove="1" noResize="1" noEditPoints="1" noAdjustHandles="1" noChangeArrowheads="1" noChangeShapeType="1" noTextEdit="1"/>
+          </p:cNvSpPr>
+          <p:nvPr>
+            <p:extLst>
+              <p:ext uri="{386F3935-93C4-4BCD-93E2-E3B085C9AB24}">
+                <p16:designElem xmlns:p16="http://schemas.microsoft.com/office/powerpoint/2015/main" val="1"/>
+              </p:ext>
+            </p:extLst>
+          </p:nvPr>
+        </p:nvSpPr>
+        <p:spPr>
+          <a:xfrm>
+            <a:off x="962042" y="0"/>
+            <a:ext cx="45719" cy="6858000"/>
+          </a:xfrm>
+          <a:prstGeom prst="rect">
+            <a:avLst/>
+          </a:prstGeom>
+          <a:solidFill>
+            <a:schemeClr val="accent6"/>
+          </a:solidFill>
+          <a:ln>
+            <a:noFill/>
+          </a:ln>
+        </p:spPr>
+        <p:style>
+          <a:lnRef idx="2">
+            <a:schemeClr val="accent1">
+              <a:shade val="50000"/>
+            </a:schemeClr>
+          </a:lnRef>
+          <a:fillRef idx="1">
+            <a:schemeClr val="accent1"/>
+          </a:fillRef>
+          <a:effectRef idx="0">
+            <a:schemeClr val="accent1"/>
+          </a:effectRef>
+          <a:fontRef idx="minor">
+            <a:schemeClr val="lt1"/>
+          </a:fontRef>
+        </p:style>
+      </p:sp>
+      <p:sp>
+        <p:nvSpPr>
+          <p:cNvPr id="20" name="Rectangle 19">
+            <a:extLst>
+              <a:ext uri="{FF2B5EF4-FFF2-40B4-BE49-F238E27FC236}">
+                <a16:creationId xmlns:a16="http://schemas.microsoft.com/office/drawing/2014/main" id="{FE35963E-79B2-4A8E-8F24-A94E8DDDD5D4}"/>
+              </a:ext>
+              <a:ext uri="{C183D7F6-B498-43B3-948B-1728B52AA6E4}">
+                <adec:decorative xmlns:adec="http://schemas.microsoft.com/office/drawing/2017/decorative" val="1"/>
+              </a:ext>
+            </a:extLst>
+          </p:cNvPr>
+          <p:cNvSpPr>
+            <a:spLocks noGrp="1" noRot="1" noChangeAspect="1" noMove="1" noResize="1" noEditPoints="1" noAdjustHandles="1" noChangeArrowheads="1" noChangeShapeType="1" noTextEdit="1"/>
+          </p:cNvSpPr>
+          <p:nvPr>
+            <p:extLst>
+              <p:ext uri="{386F3935-93C4-4BCD-93E2-E3B085C9AB24}">
+                <p16:designElem xmlns:p16="http://schemas.microsoft.com/office/powerpoint/2015/main" val="1"/>
+              </p:ext>
+            </p:extLst>
+          </p:nvPr>
+        </p:nvSpPr>
+        <p:spPr>
+          <a:xfrm>
+            <a:off x="1007533" y="0"/>
+            <a:ext cx="7934348" cy="6858000"/>
+          </a:xfrm>
+          <a:prstGeom prst="rect">
+            <a:avLst/>
+          </a:prstGeom>
+          <a:solidFill>
+            <a:schemeClr val="bg2">
+              <a:alpha val="92000"/>
+            </a:schemeClr>
+          </a:solidFill>
+          <a:ln>
+            <a:noFill/>
+          </a:ln>
+        </p:spPr>
+        <p:style>
+          <a:lnRef idx="2">
+            <a:schemeClr val="accent1">
+              <a:shade val="50000"/>
+            </a:schemeClr>
+          </a:lnRef>
+          <a:fillRef idx="1">
+            <a:schemeClr val="accent1"/>
+          </a:fillRef>
+          <a:effectRef idx="0">
+            <a:schemeClr val="accent1"/>
+          </a:effectRef>
+          <a:fontRef idx="minor">
+            <a:schemeClr val="lt1"/>
+          </a:fontRef>
+        </p:style>
+      </p:sp>
+      <p:sp>
+        <p:nvSpPr>
+          <p:cNvPr id="22" name="Rectangle 21">
+            <a:extLst>
+              <a:ext uri="{FF2B5EF4-FFF2-40B4-BE49-F238E27FC236}">
+                <a16:creationId xmlns:a16="http://schemas.microsoft.com/office/drawing/2014/main" id="{308E4331-210E-4E5F-9501-4C830E340055}"/>
+              </a:ext>
+              <a:ext uri="{C183D7F6-B498-43B3-948B-1728B52AA6E4}">
+                <adec:decorative xmlns:adec="http://schemas.microsoft.com/office/drawing/2017/decorative" val="1"/>
+              </a:ext>
+            </a:extLst>
+          </p:cNvPr>
+          <p:cNvSpPr>
+            <a:spLocks noGrp="1" noRot="1" noChangeAspect="1" noMove="1" noResize="1" noEditPoints="1" noAdjustHandles="1" noChangeArrowheads="1" noChangeShapeType="1" noTextEdit="1"/>
+          </p:cNvSpPr>
+          <p:nvPr>
+            <p:extLst>
+              <p:ext uri="{386F3935-93C4-4BCD-93E2-E3B085C9AB24}">
+                <p16:designElem xmlns:p16="http://schemas.microsoft.com/office/powerpoint/2015/main" val="1"/>
+              </p:ext>
+            </p:extLst>
+          </p:nvPr>
+        </p:nvSpPr>
+        <p:spPr>
+          <a:xfrm>
+            <a:off x="8941881" y="0"/>
+            <a:ext cx="27432" cy="6858000"/>
+          </a:xfrm>
+          <a:prstGeom prst="rect">
+            <a:avLst/>
+          </a:prstGeom>
+          <a:solidFill>
+            <a:schemeClr val="accent6"/>
+          </a:solidFill>
+          <a:ln>
+            <a:noFill/>
+          </a:ln>
+        </p:spPr>
+        <p:style>
+          <a:lnRef idx="2">
+            <a:schemeClr val="accent1">
+              <a:shade val="50000"/>
+            </a:schemeClr>
+          </a:lnRef>
+          <a:fillRef idx="1">
+            <a:schemeClr val="accent1"/>
+          </a:fillRef>
+          <a:effectRef idx="0">
+            <a:schemeClr val="accent1"/>
+          </a:effectRef>
+          <a:fontRef idx="minor">
+            <a:schemeClr val="lt1"/>
+          </a:fontRef>
+        </p:style>
+      </p:sp>
+      <p:sp>
+        <p:nvSpPr>
+          <p:cNvPr id="24" name="TextBox 23">
+            <a:extLst>
+              <a:ext uri="{FF2B5EF4-FFF2-40B4-BE49-F238E27FC236}">
+                <a16:creationId xmlns:a16="http://schemas.microsoft.com/office/drawing/2014/main" id="{1A54F778-4E1C-4F6F-9318-9795AA35C246}"/>
+              </a:ext>
+              <a:ext uri="{C183D7F6-B498-43B3-948B-1728B52AA6E4}">
+                <adec:decorative xmlns:adec="http://schemas.microsoft.com/office/drawing/2017/decorative" val="1"/>
+              </a:ext>
+            </a:extLst>
+          </p:cNvPr>
+          <p:cNvSpPr txBox="1">
+            <a:spLocks noGrp="1" noRot="1" noChangeAspect="1" noMove="1" noResize="1" noEditPoints="1" noAdjustHandles="1" noChangeArrowheads="1" noChangeShapeType="1" noTextEdit="1"/>
+          </p:cNvSpPr>
+          <p:nvPr>
+            <p:extLst>
+              <p:ext uri="{386F3935-93C4-4BCD-93E2-E3B085C9AB24}">
+                <p16:designElem xmlns:p16="http://schemas.microsoft.com/office/powerpoint/2015/main" val="1"/>
+              </p:ext>
+            </p:extLst>
+          </p:nvPr>
+        </p:nvSpPr>
+        <p:spPr>
+          <a:xfrm>
+            <a:off x="2191282" y="3262852"/>
+            <a:ext cx="415636" cy="461665"/>
+          </a:xfrm>
+          <a:prstGeom prst="rect">
+            <a:avLst/>
+          </a:prstGeom>
+          <a:noFill/>
+        </p:spPr>
+        <p:txBody>
+          <a:bodyPr wrap="square" rtlCol="0">
+            <a:spAutoFit/>
+          </a:bodyPr>
+          <a:lstStyle/>
+          <a:p>
+            <a:pPr algn="r">
+              <a:spcAft>
+                <a:spcPts val="600"/>
+              </a:spcAft>
+            </a:pPr>
+            <a:r>
+              <a:rPr lang="en-US" sz="2400" dirty="0">
+                <a:solidFill>
+                  <a:schemeClr val="accent6"/>
+                </a:solidFill>
+                <a:latin typeface="Wingdings 3" panose="05040102010807070707" pitchFamily="18" charset="2"/>
+              </a:rPr>
+              <a:t>z</a:t>
+            </a:r>
+            <a:endParaRPr lang="en-US" sz="2400" dirty="0">
+              <a:solidFill>
+                <a:schemeClr val="accent6"/>
+              </a:solidFill>
+              <a:latin typeface="MS Shell Dlg 2" panose="020B0604030504040204" pitchFamily="34" charset="0"/>
+            </a:endParaRPr>
+          </a:p>
+        </p:txBody>
+      </p:sp>
+      <p:sp useBgFill="1">
+        <p:nvSpPr>
+          <p:cNvPr id="26" name="Rectangle 25">
+            <a:extLst>
+              <a:ext uri="{FF2B5EF4-FFF2-40B4-BE49-F238E27FC236}">
+                <a16:creationId xmlns:a16="http://schemas.microsoft.com/office/drawing/2014/main" id="{E8A01EA6-BAE4-49FA-BDE0-C6CBA724F84A}"/>
+              </a:ext>
+              <a:ext uri="{C183D7F6-B498-43B3-948B-1728B52AA6E4}">
+                <adec:decorative xmlns:adec="http://schemas.microsoft.com/office/drawing/2017/decorative" val="1"/>
+              </a:ext>
+            </a:extLst>
+          </p:cNvPr>
+          <p:cNvSpPr>
+            <a:spLocks noGrp="1" noRot="1" noChangeAspect="1" noMove="1" noResize="1" noEditPoints="1" noAdjustHandles="1" noChangeArrowheads="1" noChangeShapeType="1" noTextEdit="1"/>
+          </p:cNvSpPr>
+          <p:nvPr>
+            <p:extLst>
+              <p:ext uri="{386F3935-93C4-4BCD-93E2-E3B085C9AB24}">
+                <p16:designElem xmlns:p16="http://schemas.microsoft.com/office/powerpoint/2015/main" val="1"/>
+              </p:ext>
+            </p:extLst>
+          </p:nvPr>
+        </p:nvSpPr>
+        <p:spPr>
+          <a:xfrm>
+            <a:off x="0" y="0"/>
+            <a:ext cx="12189867" cy="6855282"/>
+          </a:xfrm>
+          <a:prstGeom prst="rect">
+            <a:avLst/>
+          </a:prstGeom>
+          <a:ln>
+            <a:noFill/>
+          </a:ln>
+        </p:spPr>
+        <p:style>
+          <a:lnRef idx="2">
+            <a:schemeClr val="accent1">
+              <a:shade val="50000"/>
+            </a:schemeClr>
+          </a:lnRef>
+          <a:fillRef idx="1">
+            <a:schemeClr val="accent1"/>
+          </a:fillRef>
+          <a:effectRef idx="0">
+            <a:schemeClr val="accent1"/>
+          </a:effectRef>
+          <a:fontRef idx="minor">
+            <a:schemeClr val="lt1"/>
+          </a:fontRef>
+        </p:style>
+        <p:txBody>
+          <a:bodyPr rtlCol="0" anchor="ctr"/>
+          <a:lstStyle/>
+          <a:p>
+            <a:pPr algn="ctr"/>
+            <a:endParaRPr lang="en-US"/>
+          </a:p>
+        </p:txBody>
+      </p:sp>
+      <p:pic>
+        <p:nvPicPr>
+          <p:cNvPr id="28" name="Picture 27">
+            <a:extLst>
+              <a:ext uri="{FF2B5EF4-FFF2-40B4-BE49-F238E27FC236}">
+                <a16:creationId xmlns:a16="http://schemas.microsoft.com/office/drawing/2014/main" id="{A62E93F4-9BFB-4F60-8D89-740021B53D27}"/>
+              </a:ext>
+              <a:ext uri="{C183D7F6-B498-43B3-948B-1728B52AA6E4}">
+                <adec:decorative xmlns:adec="http://schemas.microsoft.com/office/drawing/2017/decorative" val="1"/>
+              </a:ext>
+            </a:extLst>
+          </p:cNvPr>
+          <p:cNvPicPr>
+            <a:picLocks noGrp="1" noRot="1" noChangeAspect="1" noMove="1" noResize="1" noEditPoints="1" noAdjustHandles="1" noChangeArrowheads="1" noChangeShapeType="1" noCrop="1"/>
+          </p:cNvPicPr>
+          <p:nvPr>
+            <p:extLst>
+              <p:ext uri="{386F3935-93C4-4BCD-93E2-E3B085C9AB24}">
+                <p16:designElem xmlns:p16="http://schemas.microsoft.com/office/powerpoint/2015/main" val="1"/>
+              </p:ext>
+            </p:extLst>
+          </p:nvPr>
+        </p:nvPicPr>
+        <p:blipFill>
+          <a:blip r:embed="rId3">
+            <a:extLst>
+              <a:ext uri="{28A0092B-C50C-407E-A947-70E740481C1C}">
+                <a14:useLocalDpi xmlns:a14="http://schemas.microsoft.com/office/drawing/2010/main" val="0"/>
+              </a:ext>
+            </a:extLst>
+          </a:blip>
+          <a:stretch>
+            <a:fillRect/>
+          </a:stretch>
+        </p:blipFill>
+        <p:spPr>
+          <a:xfrm>
+            <a:off x="2831794" y="2105202"/>
+            <a:ext cx="9360205" cy="4752798"/>
+          </a:xfrm>
+          <a:prstGeom prst="rect">
+            <a:avLst/>
+          </a:prstGeom>
+        </p:spPr>
+      </p:pic>
+      <p:pic>
+        <p:nvPicPr>
+          <p:cNvPr id="30" name="Picture 29">
+            <a:extLst>
+              <a:ext uri="{FF2B5EF4-FFF2-40B4-BE49-F238E27FC236}">
+                <a16:creationId xmlns:a16="http://schemas.microsoft.com/office/drawing/2014/main" id="{1A1B6056-1159-4FC3-8561-8E7E5B83E51D}"/>
+              </a:ext>
+              <a:ext uri="{C183D7F6-B498-43B3-948B-1728B52AA6E4}">
+                <adec:decorative xmlns:adec="http://schemas.microsoft.com/office/drawing/2017/decorative" val="1"/>
+              </a:ext>
+            </a:extLst>
+          </p:cNvPr>
+          <p:cNvPicPr>
+            <a:picLocks noGrp="1" noRot="1" noChangeAspect="1" noMove="1" noResize="1" noEditPoints="1" noAdjustHandles="1" noChangeArrowheads="1" noChangeShapeType="1" noCrop="1"/>
+          </p:cNvPicPr>
+          <p:nvPr>
+            <p:extLst>
+              <p:ext uri="{386F3935-93C4-4BCD-93E2-E3B085C9AB24}">
+                <p16:designElem xmlns:p16="http://schemas.microsoft.com/office/powerpoint/2015/main" val="1"/>
+              </p:ext>
+            </p:extLst>
+          </p:nvPr>
+        </p:nvPicPr>
+        <p:blipFill>
+          <a:blip r:embed="rId4">
+            <a:alphaModFix/>
+            <a:extLst>
+              <a:ext uri="{28A0092B-C50C-407E-A947-70E740481C1C}">
+                <a14:useLocalDpi xmlns:a14="http://schemas.microsoft.com/office/drawing/2010/main" val="0"/>
+              </a:ext>
+            </a:extLst>
+          </a:blip>
+          <a:stretch>
+            <a:fillRect/>
+          </a:stretch>
+        </p:blipFill>
+        <p:spPr>
+          <a:xfrm>
+            <a:off x="0" y="0"/>
+            <a:ext cx="12189867" cy="6858000"/>
+          </a:xfrm>
+          <a:prstGeom prst="rect">
+            <a:avLst/>
+          </a:prstGeom>
+        </p:spPr>
+      </p:pic>
+      <p:sp>
+        <p:nvSpPr>
+          <p:cNvPr id="32" name="Rectangle 31">
+            <a:extLst>
+              <a:ext uri="{FF2B5EF4-FFF2-40B4-BE49-F238E27FC236}">
+                <a16:creationId xmlns:a16="http://schemas.microsoft.com/office/drawing/2014/main" id="{2BCD7CE8-C8D7-4B6C-8509-15892605FAB1}"/>
+              </a:ext>
+              <a:ext uri="{C183D7F6-B498-43B3-948B-1728B52AA6E4}">
+                <adec:decorative xmlns:adec="http://schemas.microsoft.com/office/drawing/2017/decorative" val="1"/>
+              </a:ext>
+            </a:extLst>
+          </p:cNvPr>
+          <p:cNvSpPr>
+            <a:spLocks noGrp="1" noRot="1" noChangeAspect="1" noMove="1" noResize="1" noEditPoints="1" noAdjustHandles="1" noChangeArrowheads="1" noChangeShapeType="1" noTextEdit="1"/>
+          </p:cNvSpPr>
+          <p:nvPr>
+            <p:extLst>
+              <p:ext uri="{386F3935-93C4-4BCD-93E2-E3B085C9AB24}">
+                <p16:designElem xmlns:p16="http://schemas.microsoft.com/office/powerpoint/2015/main" val="1"/>
+              </p:ext>
+            </p:extLst>
+          </p:nvPr>
+        </p:nvSpPr>
+        <p:spPr>
+          <a:xfrm>
+            <a:off x="0" y="0"/>
+            <a:ext cx="964174" cy="6858000"/>
+          </a:xfrm>
+          <a:prstGeom prst="rect">
+            <a:avLst/>
+          </a:prstGeom>
+          <a:solidFill>
+            <a:schemeClr val="bg2"/>
+          </a:solidFill>
+          <a:ln>
+            <a:noFill/>
+          </a:ln>
+        </p:spPr>
+        <p:style>
+          <a:lnRef idx="2">
+            <a:schemeClr val="accent1">
+              <a:shade val="50000"/>
+            </a:schemeClr>
+          </a:lnRef>
+          <a:fillRef idx="1">
+            <a:schemeClr val="accent1"/>
+          </a:fillRef>
+          <a:effectRef idx="0">
+            <a:schemeClr val="accent1"/>
+          </a:effectRef>
+          <a:fontRef idx="minor">
+            <a:schemeClr val="lt1"/>
+          </a:fontRef>
+        </p:style>
+        <p:txBody>
+          <a:bodyPr rtlCol="0" anchor="ctr"/>
+          <a:lstStyle/>
+          <a:p>
+            <a:pPr algn="ctr"/>
+            <a:endParaRPr lang="en-US"/>
+          </a:p>
+        </p:txBody>
+      </p:sp>
+      <p:sp>
+        <p:nvSpPr>
+          <p:cNvPr id="34" name="Rectangle 33">
+            <a:extLst>
+              <a:ext uri="{FF2B5EF4-FFF2-40B4-BE49-F238E27FC236}">
+                <a16:creationId xmlns:a16="http://schemas.microsoft.com/office/drawing/2014/main" id="{2280C4E4-90AE-48E6-9E01-4D4F7FBDB968}"/>
+              </a:ext>
+              <a:ext uri="{C183D7F6-B498-43B3-948B-1728B52AA6E4}">
+                <adec:decorative xmlns:adec="http://schemas.microsoft.com/office/drawing/2017/decorative" val="1"/>
+              </a:ext>
+            </a:extLst>
+          </p:cNvPr>
+          <p:cNvSpPr>
+            <a:spLocks noGrp="1" noRot="1" noChangeAspect="1" noMove="1" noResize="1" noEditPoints="1" noAdjustHandles="1" noChangeArrowheads="1" noChangeShapeType="1" noTextEdit="1"/>
+          </p:cNvSpPr>
+          <p:nvPr>
+            <p:extLst>
+              <p:ext uri="{386F3935-93C4-4BCD-93E2-E3B085C9AB24}">
+                <p16:designElem xmlns:p16="http://schemas.microsoft.com/office/powerpoint/2015/main" val="1"/>
+              </p:ext>
+            </p:extLst>
+          </p:nvPr>
+        </p:nvSpPr>
+        <p:spPr>
+          <a:xfrm>
+            <a:off x="962042" y="0"/>
+            <a:ext cx="45719" cy="6858000"/>
+          </a:xfrm>
+          <a:prstGeom prst="rect">
+            <a:avLst/>
+          </a:prstGeom>
+          <a:solidFill>
+            <a:schemeClr val="accent6"/>
+          </a:solidFill>
+          <a:ln>
+            <a:noFill/>
+          </a:ln>
+        </p:spPr>
+        <p:style>
+          <a:lnRef idx="2">
+            <a:schemeClr val="accent1">
+              <a:shade val="50000"/>
+            </a:schemeClr>
+          </a:lnRef>
+          <a:fillRef idx="1">
+            <a:schemeClr val="accent1"/>
+          </a:fillRef>
+          <a:effectRef idx="0">
+            <a:schemeClr val="accent1"/>
+          </a:effectRef>
+          <a:fontRef idx="minor">
+            <a:schemeClr val="lt1"/>
+          </a:fontRef>
+        </p:style>
+        <p:txBody>
+          <a:bodyPr rtlCol="0" anchor="ctr"/>
+          <a:lstStyle/>
+          <a:p>
+            <a:pPr algn="ctr"/>
+            <a:endParaRPr lang="en-US"/>
+          </a:p>
+        </p:txBody>
+      </p:sp>
+      <p:sp>
+        <p:nvSpPr>
+          <p:cNvPr id="36" name="Rectangle 35">
+            <a:extLst>
+              <a:ext uri="{FF2B5EF4-FFF2-40B4-BE49-F238E27FC236}">
+                <a16:creationId xmlns:a16="http://schemas.microsoft.com/office/drawing/2014/main" id="{876C1BA3-C0EA-4AEE-9B4C-8F66E6FC30F1}"/>
+              </a:ext>
+              <a:ext uri="{C183D7F6-B498-43B3-948B-1728B52AA6E4}">
+                <adec:decorative xmlns:adec="http://schemas.microsoft.com/office/drawing/2017/decorative" val="1"/>
+              </a:ext>
+            </a:extLst>
+          </p:cNvPr>
+          <p:cNvSpPr>
+            <a:spLocks noGrp="1" noRot="1" noChangeAspect="1" noMove="1" noResize="1" noEditPoints="1" noAdjustHandles="1" noChangeArrowheads="1" noChangeShapeType="1" noTextEdit="1"/>
+          </p:cNvSpPr>
+          <p:nvPr>
+            <p:extLst>
+              <p:ext uri="{386F3935-93C4-4BCD-93E2-E3B085C9AB24}">
+                <p16:designElem xmlns:p16="http://schemas.microsoft.com/office/powerpoint/2015/main" val="1"/>
+              </p:ext>
+            </p:extLst>
+          </p:nvPr>
+        </p:nvSpPr>
+        <p:spPr>
+          <a:xfrm>
+            <a:off x="1007533" y="0"/>
+            <a:ext cx="10378001" cy="6858000"/>
+          </a:xfrm>
+          <a:prstGeom prst="rect">
+            <a:avLst/>
+          </a:prstGeom>
+          <a:solidFill>
+            <a:schemeClr val="bg2">
+              <a:alpha val="92000"/>
+            </a:schemeClr>
+          </a:solidFill>
+          <a:ln>
+            <a:noFill/>
+          </a:ln>
+        </p:spPr>
+        <p:style>
+          <a:lnRef idx="2">
+            <a:schemeClr val="accent1">
+              <a:shade val="50000"/>
+            </a:schemeClr>
+          </a:lnRef>
+          <a:fillRef idx="1">
+            <a:schemeClr val="accent1"/>
+          </a:fillRef>
+          <a:effectRef idx="0">
+            <a:schemeClr val="accent1"/>
+          </a:effectRef>
+          <a:fontRef idx="minor">
+            <a:schemeClr val="lt1"/>
+          </a:fontRef>
+        </p:style>
+        <p:txBody>
+          <a:bodyPr rtlCol="0" anchor="ctr"/>
+          <a:lstStyle/>
+          <a:p>
+            <a:pPr algn="ctr"/>
+            <a:endParaRPr lang="en-US"/>
+          </a:p>
+        </p:txBody>
+      </p:sp>
       <p:sp>
         <p:nvSpPr>
           <p:cNvPr id="2" name="Title 1">
@@ -8675,43 +9410,207 @@
         </p:nvSpPr>
         <p:spPr>
           <a:xfrm>
-            <a:off x="2611808" y="808056"/>
-            <a:ext cx="8260980" cy="1077229"/>
+            <a:off x="1649578" y="4155620"/>
+            <a:ext cx="3380165" cy="1725789"/>
           </a:xfrm>
         </p:spPr>
         <p:txBody>
-          <a:bodyPr/>
+          <a:bodyPr vert="horz" lIns="91440" tIns="45720" rIns="91440" bIns="45720" rtlCol="0" anchor="t">
+            <a:normAutofit/>
+          </a:bodyPr>
           <a:lstStyle/>
           <a:p>
             <a:r>
-              <a:rPr lang="en-US" dirty="0"/>
+              <a:rPr lang="en-US" sz="3600" dirty="0"/>
               <a:t>Dispensary Saturation and Violent Crimes</a:t>
             </a:r>
           </a:p>
         </p:txBody>
       </p:sp>
-      <p:sp>
-        <p:nvSpPr>
-          <p:cNvPr id="3" name="Content Placeholder 2">
+      <p:pic>
+        <p:nvPicPr>
+          <p:cNvPr id="5" name="Picture 4" descr="A screenshot of a cell phone&#10;&#10;Description automatically generated">
             <a:extLst>
               <a:ext uri="{FF2B5EF4-FFF2-40B4-BE49-F238E27FC236}">
-                <a16:creationId xmlns:a16="http://schemas.microsoft.com/office/drawing/2014/main" id="{278FBB1D-978A-2F4F-BAED-7F57C72B7FD8}"/>
+                <a16:creationId xmlns:a16="http://schemas.microsoft.com/office/drawing/2014/main" id="{3BDDEDD0-02A4-4C4B-AB4D-96A4B0EA9FA0}"/>
+              </a:ext>
+            </a:extLst>
+          </p:cNvPr>
+          <p:cNvPicPr>
+            <a:picLocks noChangeAspect="1"/>
+          </p:cNvPicPr>
+          <p:nvPr/>
+        </p:nvPicPr>
+        <p:blipFill>
+          <a:blip r:embed="rId5"/>
+          <a:stretch>
+            <a:fillRect/>
+          </a:stretch>
+        </p:blipFill>
+        <p:spPr>
+          <a:xfrm>
+            <a:off x="6323282" y="654735"/>
+            <a:ext cx="4884831" cy="5677898"/>
+          </a:xfrm>
+          <a:prstGeom prst="rect">
+            <a:avLst/>
+          </a:prstGeom>
+          <a:ln>
+            <a:gradFill flip="none" rotWithShape="1">
+              <a:gsLst>
+                <a:gs pos="86000">
+                  <a:schemeClr val="accent6">
+                    <a:lumMod val="67000"/>
+                  </a:schemeClr>
+                </a:gs>
+                <a:gs pos="20000">
+                  <a:schemeClr val="accent6">
+                    <a:lumMod val="97000"/>
+                    <a:lumOff val="3000"/>
+                  </a:schemeClr>
+                </a:gs>
+                <a:gs pos="100000">
+                  <a:schemeClr val="accent6">
+                    <a:lumMod val="60000"/>
+                    <a:lumOff val="40000"/>
+                  </a:schemeClr>
+                </a:gs>
+              </a:gsLst>
+              <a:lin ang="16200000" scaled="1"/>
+              <a:tileRect/>
+            </a:gradFill>
+          </a:ln>
+          <a:effectLst>
+            <a:innerShdw blurRad="127000">
+              <a:prstClr val="black">
+                <a:alpha val="90000"/>
+              </a:prstClr>
+            </a:innerShdw>
+          </a:effectLst>
+        </p:spPr>
+      </p:pic>
+      <p:pic>
+        <p:nvPicPr>
+          <p:cNvPr id="7" name="Picture 6" descr="A close up of a map&#10;&#10;Description automatically generated">
+            <a:extLst>
+              <a:ext uri="{FF2B5EF4-FFF2-40B4-BE49-F238E27FC236}">
+                <a16:creationId xmlns:a16="http://schemas.microsoft.com/office/drawing/2014/main" id="{D5A9F018-2E43-BB41-AD65-80F82C80A91D}"/>
+              </a:ext>
+            </a:extLst>
+          </p:cNvPr>
+          <p:cNvPicPr>
+            <a:picLocks noChangeAspect="1"/>
+          </p:cNvPicPr>
+          <p:nvPr/>
+        </p:nvPicPr>
+        <p:blipFill>
+          <a:blip r:embed="rId6"/>
+          <a:stretch>
+            <a:fillRect/>
+          </a:stretch>
+        </p:blipFill>
+        <p:spPr>
+          <a:xfrm>
+            <a:off x="1649578" y="662179"/>
+            <a:ext cx="3866389" cy="2618557"/>
+          </a:xfrm>
+          <a:prstGeom prst="rect">
+            <a:avLst/>
+          </a:prstGeom>
+          <a:ln>
+            <a:gradFill flip="none" rotWithShape="1">
+              <a:gsLst>
+                <a:gs pos="86000">
+                  <a:schemeClr val="accent6">
+                    <a:lumMod val="67000"/>
+                  </a:schemeClr>
+                </a:gs>
+                <a:gs pos="20000">
+                  <a:schemeClr val="accent6">
+                    <a:lumMod val="97000"/>
+                    <a:lumOff val="3000"/>
+                  </a:schemeClr>
+                </a:gs>
+                <a:gs pos="100000">
+                  <a:schemeClr val="accent6">
+                    <a:lumMod val="60000"/>
+                    <a:lumOff val="40000"/>
+                  </a:schemeClr>
+                </a:gs>
+              </a:gsLst>
+              <a:lin ang="16200000" scaled="1"/>
+              <a:tileRect/>
+            </a:gradFill>
+          </a:ln>
+          <a:effectLst>
+            <a:innerShdw blurRad="127000">
+              <a:prstClr val="black">
+                <a:alpha val="90000"/>
+              </a:prstClr>
+            </a:innerShdw>
+          </a:effectLst>
+        </p:spPr>
+      </p:pic>
+      <p:sp>
+        <p:nvSpPr>
+          <p:cNvPr id="38" name="Rectangle 37">
+            <a:extLst>
+              <a:ext uri="{FF2B5EF4-FFF2-40B4-BE49-F238E27FC236}">
+                <a16:creationId xmlns:a16="http://schemas.microsoft.com/office/drawing/2014/main" id="{16BCFD5C-CD97-4975-8BA8-D6A4A5D0CAB2}"/>
+              </a:ext>
+              <a:ext uri="{C183D7F6-B498-43B3-948B-1728B52AA6E4}">
+                <adec:decorative xmlns:adec="http://schemas.microsoft.com/office/drawing/2017/decorative" val="1"/>
               </a:ext>
             </a:extLst>
           </p:cNvPr>
           <p:cNvSpPr>
-            <a:spLocks noGrp="1"/>
+            <a:spLocks noGrp="1" noRot="1" noChangeAspect="1" noMove="1" noResize="1" noEditPoints="1" noAdjustHandles="1" noChangeArrowheads="1" noChangeShapeType="1" noTextEdit="1"/>
           </p:cNvSpPr>
           <p:nvPr>
-            <p:ph idx="1"/>
+            <p:extLst>
+              <p:ext uri="{386F3935-93C4-4BCD-93E2-E3B085C9AB24}">
+                <p16:designElem xmlns:p16="http://schemas.microsoft.com/office/powerpoint/2015/main" val="1"/>
+              </p:ext>
+            </p:extLst>
           </p:nvPr>
         </p:nvSpPr>
-        <p:spPr/>
+        <p:spPr>
+          <a:xfrm>
+            <a:off x="11387666" y="-2718"/>
+            <a:ext cx="27432" cy="6858000"/>
+          </a:xfrm>
+          <a:prstGeom prst="rect">
+            <a:avLst/>
+          </a:prstGeom>
+          <a:solidFill>
+            <a:schemeClr val="accent6"/>
+          </a:solidFill>
+          <a:ln>
+            <a:noFill/>
+          </a:ln>
+        </p:spPr>
+        <p:style>
+          <a:lnRef idx="2">
+            <a:schemeClr val="accent1">
+              <a:shade val="50000"/>
+            </a:schemeClr>
+          </a:lnRef>
+          <a:fillRef idx="1">
+            <a:schemeClr val="accent1"/>
+          </a:fillRef>
+          <a:effectRef idx="0">
+            <a:schemeClr val="accent1"/>
+          </a:effectRef>
+          <a:fontRef idx="minor">
+            <a:schemeClr val="lt1"/>
+          </a:fontRef>
+        </p:style>
         <p:txBody>
-          <a:bodyPr/>
+          <a:bodyPr rtlCol="0" anchor="ctr"/>
           <a:lstStyle/>
           <a:p>
-            <a:endParaRPr lang="en-US" dirty="0"/>
+            <a:pPr algn="ctr"/>
+            <a:endParaRPr lang="en-US"/>
           </a:p>
         </p:txBody>
       </p:sp>
@@ -8731,6 +9630,15 @@
 <file path=ppt/slides/slide7.xml><?xml version="1.0" encoding="utf-8"?>
 <p:sld xmlns:a="http://schemas.openxmlformats.org/drawingml/2006/main" xmlns:r="http://schemas.openxmlformats.org/officeDocument/2006/relationships" xmlns:p="http://schemas.openxmlformats.org/presentationml/2006/main">
   <p:cSld>
+    <p:bg>
+      <p:bgPr>
+        <a:blipFill rotWithShape="1">
+          <a:blip r:embed="rId2"/>
+          <a:stretch/>
+        </a:blipFill>
+        <a:effectLst/>
+      </p:bgPr>
+    </p:bg>
     <p:spTree>
       <p:nvGrpSpPr>
         <p:cNvPr id="1" name=""/>
@@ -8745,6 +9653,722 @@
           <a:chExt cx="0" cy="0"/>
         </a:xfrm>
       </p:grpSpPr>
+      <p:pic>
+        <p:nvPicPr>
+          <p:cNvPr id="64" name="Picture 35">
+            <a:extLst>
+              <a:ext uri="{FF2B5EF4-FFF2-40B4-BE49-F238E27FC236}">
+                <a16:creationId xmlns:a16="http://schemas.microsoft.com/office/drawing/2014/main" id="{26AA7C31-76FD-4B44-A1FF-D13D2515AE57}"/>
+              </a:ext>
+              <a:ext uri="{C183D7F6-B498-43B3-948B-1728B52AA6E4}">
+                <adec:decorative xmlns:adec="http://schemas.microsoft.com/office/drawing/2017/decorative" val="1"/>
+              </a:ext>
+            </a:extLst>
+          </p:cNvPr>
+          <p:cNvPicPr>
+            <a:picLocks noGrp="1" noRot="1" noChangeAspect="1" noMove="1" noResize="1" noEditPoints="1" noAdjustHandles="1" noChangeArrowheads="1" noChangeShapeType="1" noCrop="1"/>
+          </p:cNvPicPr>
+          <p:nvPr>
+            <p:extLst>
+              <p:ext uri="{386F3935-93C4-4BCD-93E2-E3B085C9AB24}">
+                <p16:designElem xmlns:p16="http://schemas.microsoft.com/office/powerpoint/2015/main" val="1"/>
+              </p:ext>
+            </p:extLst>
+          </p:nvPr>
+        </p:nvPicPr>
+        <p:blipFill>
+          <a:blip r:embed="rId3">
+            <a:extLst>
+              <a:ext uri="{28A0092B-C50C-407E-A947-70E740481C1C}">
+                <a14:useLocalDpi xmlns:a14="http://schemas.microsoft.com/office/drawing/2010/main" val="0"/>
+              </a:ext>
+            </a:extLst>
+          </a:blip>
+          <a:stretch>
+            <a:fillRect/>
+          </a:stretch>
+        </p:blipFill>
+        <p:spPr>
+          <a:xfrm>
+            <a:off x="2831794" y="2105202"/>
+            <a:ext cx="9360205" cy="4752798"/>
+          </a:xfrm>
+          <a:prstGeom prst="rect">
+            <a:avLst/>
+          </a:prstGeom>
+        </p:spPr>
+      </p:pic>
+      <p:pic>
+        <p:nvPicPr>
+          <p:cNvPr id="65" name="Picture 37">
+            <a:extLst>
+              <a:ext uri="{FF2B5EF4-FFF2-40B4-BE49-F238E27FC236}">
+                <a16:creationId xmlns:a16="http://schemas.microsoft.com/office/drawing/2014/main" id="{F5CE85F9-F4EE-4E5D-8235-528527A401D8}"/>
+              </a:ext>
+              <a:ext uri="{C183D7F6-B498-43B3-948B-1728B52AA6E4}">
+                <adec:decorative xmlns:adec="http://schemas.microsoft.com/office/drawing/2017/decorative" val="1"/>
+              </a:ext>
+            </a:extLst>
+          </p:cNvPr>
+          <p:cNvPicPr>
+            <a:picLocks noGrp="1" noRot="1" noChangeAspect="1" noMove="1" noResize="1" noEditPoints="1" noAdjustHandles="1" noChangeArrowheads="1" noChangeShapeType="1" noCrop="1"/>
+          </p:cNvPicPr>
+          <p:nvPr>
+            <p:extLst>
+              <p:ext uri="{386F3935-93C4-4BCD-93E2-E3B085C9AB24}">
+                <p16:designElem xmlns:p16="http://schemas.microsoft.com/office/powerpoint/2015/main" val="1"/>
+              </p:ext>
+            </p:extLst>
+          </p:nvPr>
+        </p:nvPicPr>
+        <p:blipFill>
+          <a:blip r:embed="rId4">
+            <a:extLst>
+              <a:ext uri="{28A0092B-C50C-407E-A947-70E740481C1C}">
+                <a14:useLocalDpi xmlns:a14="http://schemas.microsoft.com/office/drawing/2010/main" val="0"/>
+              </a:ext>
+            </a:extLst>
+          </a:blip>
+          <a:stretch>
+            <a:fillRect/>
+          </a:stretch>
+        </p:blipFill>
+        <p:spPr>
+          <a:xfrm>
+            <a:off x="0" y="0"/>
+            <a:ext cx="12189867" cy="6858000"/>
+          </a:xfrm>
+          <a:prstGeom prst="rect">
+            <a:avLst/>
+          </a:prstGeom>
+        </p:spPr>
+      </p:pic>
+      <p:sp>
+        <p:nvSpPr>
+          <p:cNvPr id="66" name="Rectangle 39">
+            <a:extLst>
+              <a:ext uri="{FF2B5EF4-FFF2-40B4-BE49-F238E27FC236}">
+                <a16:creationId xmlns:a16="http://schemas.microsoft.com/office/drawing/2014/main" id="{17338BB4-74FF-4836-86B7-F1B0C2B62DA9}"/>
+              </a:ext>
+              <a:ext uri="{C183D7F6-B498-43B3-948B-1728B52AA6E4}">
+                <adec:decorative xmlns:adec="http://schemas.microsoft.com/office/drawing/2017/decorative" val="1"/>
+              </a:ext>
+            </a:extLst>
+          </p:cNvPr>
+          <p:cNvSpPr>
+            <a:spLocks noGrp="1" noRot="1" noChangeAspect="1" noMove="1" noResize="1" noEditPoints="1" noAdjustHandles="1" noChangeArrowheads="1" noChangeShapeType="1" noTextEdit="1"/>
+          </p:cNvSpPr>
+          <p:nvPr>
+            <p:extLst>
+              <p:ext uri="{386F3935-93C4-4BCD-93E2-E3B085C9AB24}">
+                <p16:designElem xmlns:p16="http://schemas.microsoft.com/office/powerpoint/2015/main" val="1"/>
+              </p:ext>
+            </p:extLst>
+          </p:nvPr>
+        </p:nvSpPr>
+        <p:spPr>
+          <a:xfrm>
+            <a:off x="0" y="0"/>
+            <a:ext cx="964174" cy="6858000"/>
+          </a:xfrm>
+          <a:prstGeom prst="rect">
+            <a:avLst/>
+          </a:prstGeom>
+          <a:solidFill>
+            <a:schemeClr val="bg2"/>
+          </a:solidFill>
+          <a:ln>
+            <a:noFill/>
+          </a:ln>
+        </p:spPr>
+        <p:style>
+          <a:lnRef idx="2">
+            <a:schemeClr val="accent1">
+              <a:shade val="50000"/>
+            </a:schemeClr>
+          </a:lnRef>
+          <a:fillRef idx="1">
+            <a:schemeClr val="accent1"/>
+          </a:fillRef>
+          <a:effectRef idx="0">
+            <a:schemeClr val="accent1"/>
+          </a:effectRef>
+          <a:fontRef idx="minor">
+            <a:schemeClr val="lt1"/>
+          </a:fontRef>
+        </p:style>
+      </p:sp>
+      <p:sp>
+        <p:nvSpPr>
+          <p:cNvPr id="67" name="Rectangle 41">
+            <a:extLst>
+              <a:ext uri="{FF2B5EF4-FFF2-40B4-BE49-F238E27FC236}">
+                <a16:creationId xmlns:a16="http://schemas.microsoft.com/office/drawing/2014/main" id="{1ABFA8A3-A231-4BC1-B8A5-C5BE7315CD7D}"/>
+              </a:ext>
+              <a:ext uri="{C183D7F6-B498-43B3-948B-1728B52AA6E4}">
+                <adec:decorative xmlns:adec="http://schemas.microsoft.com/office/drawing/2017/decorative" val="1"/>
+              </a:ext>
+            </a:extLst>
+          </p:cNvPr>
+          <p:cNvSpPr>
+            <a:spLocks noGrp="1" noRot="1" noChangeAspect="1" noMove="1" noResize="1" noEditPoints="1" noAdjustHandles="1" noChangeArrowheads="1" noChangeShapeType="1" noTextEdit="1"/>
+          </p:cNvSpPr>
+          <p:nvPr>
+            <p:extLst>
+              <p:ext uri="{386F3935-93C4-4BCD-93E2-E3B085C9AB24}">
+                <p16:designElem xmlns:p16="http://schemas.microsoft.com/office/powerpoint/2015/main" val="1"/>
+              </p:ext>
+            </p:extLst>
+          </p:nvPr>
+        </p:nvSpPr>
+        <p:spPr>
+          <a:xfrm>
+            <a:off x="962042" y="0"/>
+            <a:ext cx="45719" cy="6858000"/>
+          </a:xfrm>
+          <a:prstGeom prst="rect">
+            <a:avLst/>
+          </a:prstGeom>
+          <a:solidFill>
+            <a:schemeClr val="accent6"/>
+          </a:solidFill>
+          <a:ln>
+            <a:noFill/>
+          </a:ln>
+        </p:spPr>
+        <p:style>
+          <a:lnRef idx="2">
+            <a:schemeClr val="accent1">
+              <a:shade val="50000"/>
+            </a:schemeClr>
+          </a:lnRef>
+          <a:fillRef idx="1">
+            <a:schemeClr val="accent1"/>
+          </a:fillRef>
+          <a:effectRef idx="0">
+            <a:schemeClr val="accent1"/>
+          </a:effectRef>
+          <a:fontRef idx="minor">
+            <a:schemeClr val="lt1"/>
+          </a:fontRef>
+        </p:style>
+      </p:sp>
+      <p:sp>
+        <p:nvSpPr>
+          <p:cNvPr id="68" name="Rectangle 43">
+            <a:extLst>
+              <a:ext uri="{FF2B5EF4-FFF2-40B4-BE49-F238E27FC236}">
+                <a16:creationId xmlns:a16="http://schemas.microsoft.com/office/drawing/2014/main" id="{FE35963E-79B2-4A8E-8F24-A94E8DDDD5D4}"/>
+              </a:ext>
+              <a:ext uri="{C183D7F6-B498-43B3-948B-1728B52AA6E4}">
+                <adec:decorative xmlns:adec="http://schemas.microsoft.com/office/drawing/2017/decorative" val="1"/>
+              </a:ext>
+            </a:extLst>
+          </p:cNvPr>
+          <p:cNvSpPr>
+            <a:spLocks noGrp="1" noRot="1" noChangeAspect="1" noMove="1" noResize="1" noEditPoints="1" noAdjustHandles="1" noChangeArrowheads="1" noChangeShapeType="1" noTextEdit="1"/>
+          </p:cNvSpPr>
+          <p:nvPr>
+            <p:extLst>
+              <p:ext uri="{386F3935-93C4-4BCD-93E2-E3B085C9AB24}">
+                <p16:designElem xmlns:p16="http://schemas.microsoft.com/office/powerpoint/2015/main" val="1"/>
+              </p:ext>
+            </p:extLst>
+          </p:nvPr>
+        </p:nvSpPr>
+        <p:spPr>
+          <a:xfrm>
+            <a:off x="1007533" y="0"/>
+            <a:ext cx="7934348" cy="6858000"/>
+          </a:xfrm>
+          <a:prstGeom prst="rect">
+            <a:avLst/>
+          </a:prstGeom>
+          <a:solidFill>
+            <a:schemeClr val="bg2">
+              <a:alpha val="92000"/>
+            </a:schemeClr>
+          </a:solidFill>
+          <a:ln>
+            <a:noFill/>
+          </a:ln>
+        </p:spPr>
+        <p:style>
+          <a:lnRef idx="2">
+            <a:schemeClr val="accent1">
+              <a:shade val="50000"/>
+            </a:schemeClr>
+          </a:lnRef>
+          <a:fillRef idx="1">
+            <a:schemeClr val="accent1"/>
+          </a:fillRef>
+          <a:effectRef idx="0">
+            <a:schemeClr val="accent1"/>
+          </a:effectRef>
+          <a:fontRef idx="minor">
+            <a:schemeClr val="lt1"/>
+          </a:fontRef>
+        </p:style>
+      </p:sp>
+      <p:sp>
+        <p:nvSpPr>
+          <p:cNvPr id="69" name="Rectangle 45">
+            <a:extLst>
+              <a:ext uri="{FF2B5EF4-FFF2-40B4-BE49-F238E27FC236}">
+                <a16:creationId xmlns:a16="http://schemas.microsoft.com/office/drawing/2014/main" id="{308E4331-210E-4E5F-9501-4C830E340055}"/>
+              </a:ext>
+              <a:ext uri="{C183D7F6-B498-43B3-948B-1728B52AA6E4}">
+                <adec:decorative xmlns:adec="http://schemas.microsoft.com/office/drawing/2017/decorative" val="1"/>
+              </a:ext>
+            </a:extLst>
+          </p:cNvPr>
+          <p:cNvSpPr>
+            <a:spLocks noGrp="1" noRot="1" noChangeAspect="1" noMove="1" noResize="1" noEditPoints="1" noAdjustHandles="1" noChangeArrowheads="1" noChangeShapeType="1" noTextEdit="1"/>
+          </p:cNvSpPr>
+          <p:nvPr>
+            <p:extLst>
+              <p:ext uri="{386F3935-93C4-4BCD-93E2-E3B085C9AB24}">
+                <p16:designElem xmlns:p16="http://schemas.microsoft.com/office/powerpoint/2015/main" val="1"/>
+              </p:ext>
+            </p:extLst>
+          </p:nvPr>
+        </p:nvSpPr>
+        <p:spPr>
+          <a:xfrm>
+            <a:off x="8941881" y="0"/>
+            <a:ext cx="27432" cy="6858000"/>
+          </a:xfrm>
+          <a:prstGeom prst="rect">
+            <a:avLst/>
+          </a:prstGeom>
+          <a:solidFill>
+            <a:schemeClr val="accent6"/>
+          </a:solidFill>
+          <a:ln>
+            <a:noFill/>
+          </a:ln>
+        </p:spPr>
+        <p:style>
+          <a:lnRef idx="2">
+            <a:schemeClr val="accent1">
+              <a:shade val="50000"/>
+            </a:schemeClr>
+          </a:lnRef>
+          <a:fillRef idx="1">
+            <a:schemeClr val="accent1"/>
+          </a:fillRef>
+          <a:effectRef idx="0">
+            <a:schemeClr val="accent1"/>
+          </a:effectRef>
+          <a:fontRef idx="minor">
+            <a:schemeClr val="lt1"/>
+          </a:fontRef>
+        </p:style>
+      </p:sp>
+      <p:sp>
+        <p:nvSpPr>
+          <p:cNvPr id="70" name="TextBox 47">
+            <a:extLst>
+              <a:ext uri="{FF2B5EF4-FFF2-40B4-BE49-F238E27FC236}">
+                <a16:creationId xmlns:a16="http://schemas.microsoft.com/office/drawing/2014/main" id="{1A54F778-4E1C-4F6F-9318-9795AA35C246}"/>
+              </a:ext>
+              <a:ext uri="{C183D7F6-B498-43B3-948B-1728B52AA6E4}">
+                <adec:decorative xmlns:adec="http://schemas.microsoft.com/office/drawing/2017/decorative" val="1"/>
+              </a:ext>
+            </a:extLst>
+          </p:cNvPr>
+          <p:cNvSpPr txBox="1">
+            <a:spLocks noGrp="1" noRot="1" noChangeAspect="1" noMove="1" noResize="1" noEditPoints="1" noAdjustHandles="1" noChangeArrowheads="1" noChangeShapeType="1" noTextEdit="1"/>
+          </p:cNvSpPr>
+          <p:nvPr>
+            <p:extLst>
+              <p:ext uri="{386F3935-93C4-4BCD-93E2-E3B085C9AB24}">
+                <p16:designElem xmlns:p16="http://schemas.microsoft.com/office/powerpoint/2015/main" val="1"/>
+              </p:ext>
+            </p:extLst>
+          </p:nvPr>
+        </p:nvSpPr>
+        <p:spPr>
+          <a:xfrm>
+            <a:off x="2191282" y="3262852"/>
+            <a:ext cx="415636" cy="461665"/>
+          </a:xfrm>
+          <a:prstGeom prst="rect">
+            <a:avLst/>
+          </a:prstGeom>
+          <a:noFill/>
+        </p:spPr>
+        <p:txBody>
+          <a:bodyPr wrap="square" rtlCol="0">
+            <a:spAutoFit/>
+          </a:bodyPr>
+          <a:lstStyle/>
+          <a:p>
+            <a:pPr algn="r">
+              <a:spcAft>
+                <a:spcPts val="600"/>
+              </a:spcAft>
+            </a:pPr>
+            <a:r>
+              <a:rPr lang="en-US" sz="2400" dirty="0">
+                <a:solidFill>
+                  <a:schemeClr val="accent6"/>
+                </a:solidFill>
+                <a:latin typeface="Wingdings 3" panose="05040102010807070707" pitchFamily="18" charset="2"/>
+              </a:rPr>
+              <a:t>z</a:t>
+            </a:r>
+            <a:endParaRPr lang="en-US" sz="2400" dirty="0">
+              <a:solidFill>
+                <a:schemeClr val="accent6"/>
+              </a:solidFill>
+              <a:latin typeface="MS Shell Dlg 2" panose="020B0604030504040204" pitchFamily="34" charset="0"/>
+            </a:endParaRPr>
+          </a:p>
+        </p:txBody>
+      </p:sp>
+      <p:sp useBgFill="1">
+        <p:nvSpPr>
+          <p:cNvPr id="71" name="Rectangle 49">
+            <a:extLst>
+              <a:ext uri="{FF2B5EF4-FFF2-40B4-BE49-F238E27FC236}">
+                <a16:creationId xmlns:a16="http://schemas.microsoft.com/office/drawing/2014/main" id="{E8A01EA6-BAE4-49FA-BDE0-C6CBA724F84A}"/>
+              </a:ext>
+              <a:ext uri="{C183D7F6-B498-43B3-948B-1728B52AA6E4}">
+                <adec:decorative xmlns:adec="http://schemas.microsoft.com/office/drawing/2017/decorative" val="1"/>
+              </a:ext>
+            </a:extLst>
+          </p:cNvPr>
+          <p:cNvSpPr>
+            <a:spLocks noGrp="1" noRot="1" noChangeAspect="1" noMove="1" noResize="1" noEditPoints="1" noAdjustHandles="1" noChangeArrowheads="1" noChangeShapeType="1" noTextEdit="1"/>
+          </p:cNvSpPr>
+          <p:nvPr>
+            <p:extLst>
+              <p:ext uri="{386F3935-93C4-4BCD-93E2-E3B085C9AB24}">
+                <p16:designElem xmlns:p16="http://schemas.microsoft.com/office/powerpoint/2015/main" val="1"/>
+              </p:ext>
+            </p:extLst>
+          </p:nvPr>
+        </p:nvSpPr>
+        <p:spPr>
+          <a:xfrm>
+            <a:off x="0" y="0"/>
+            <a:ext cx="12189867" cy="6855282"/>
+          </a:xfrm>
+          <a:prstGeom prst="rect">
+            <a:avLst/>
+          </a:prstGeom>
+          <a:ln>
+            <a:noFill/>
+          </a:ln>
+        </p:spPr>
+        <p:style>
+          <a:lnRef idx="2">
+            <a:schemeClr val="accent1">
+              <a:shade val="50000"/>
+            </a:schemeClr>
+          </a:lnRef>
+          <a:fillRef idx="1">
+            <a:schemeClr val="accent1"/>
+          </a:fillRef>
+          <a:effectRef idx="0">
+            <a:schemeClr val="accent1"/>
+          </a:effectRef>
+          <a:fontRef idx="minor">
+            <a:schemeClr val="lt1"/>
+          </a:fontRef>
+        </p:style>
+        <p:txBody>
+          <a:bodyPr rtlCol="0" anchor="ctr"/>
+          <a:lstStyle/>
+          <a:p>
+            <a:pPr algn="ctr"/>
+            <a:endParaRPr lang="en-US"/>
+          </a:p>
+        </p:txBody>
+      </p:sp>
+      <p:pic>
+        <p:nvPicPr>
+          <p:cNvPr id="72" name="Picture 51">
+            <a:extLst>
+              <a:ext uri="{FF2B5EF4-FFF2-40B4-BE49-F238E27FC236}">
+                <a16:creationId xmlns:a16="http://schemas.microsoft.com/office/drawing/2014/main" id="{A62E93F4-9BFB-4F60-8D89-740021B53D27}"/>
+              </a:ext>
+              <a:ext uri="{C183D7F6-B498-43B3-948B-1728B52AA6E4}">
+                <adec:decorative xmlns:adec="http://schemas.microsoft.com/office/drawing/2017/decorative" val="1"/>
+              </a:ext>
+            </a:extLst>
+          </p:cNvPr>
+          <p:cNvPicPr>
+            <a:picLocks noGrp="1" noRot="1" noChangeAspect="1" noMove="1" noResize="1" noEditPoints="1" noAdjustHandles="1" noChangeArrowheads="1" noChangeShapeType="1" noCrop="1"/>
+          </p:cNvPicPr>
+          <p:nvPr>
+            <p:extLst>
+              <p:ext uri="{386F3935-93C4-4BCD-93E2-E3B085C9AB24}">
+                <p16:designElem xmlns:p16="http://schemas.microsoft.com/office/powerpoint/2015/main" val="1"/>
+              </p:ext>
+            </p:extLst>
+          </p:nvPr>
+        </p:nvPicPr>
+        <p:blipFill>
+          <a:blip r:embed="rId3">
+            <a:extLst>
+              <a:ext uri="{28A0092B-C50C-407E-A947-70E740481C1C}">
+                <a14:useLocalDpi xmlns:a14="http://schemas.microsoft.com/office/drawing/2010/main" val="0"/>
+              </a:ext>
+            </a:extLst>
+          </a:blip>
+          <a:stretch>
+            <a:fillRect/>
+          </a:stretch>
+        </p:blipFill>
+        <p:spPr>
+          <a:xfrm>
+            <a:off x="2831794" y="2105202"/>
+            <a:ext cx="9360205" cy="4752798"/>
+          </a:xfrm>
+          <a:prstGeom prst="rect">
+            <a:avLst/>
+          </a:prstGeom>
+        </p:spPr>
+      </p:pic>
+      <p:pic>
+        <p:nvPicPr>
+          <p:cNvPr id="73" name="Picture 53">
+            <a:extLst>
+              <a:ext uri="{FF2B5EF4-FFF2-40B4-BE49-F238E27FC236}">
+                <a16:creationId xmlns:a16="http://schemas.microsoft.com/office/drawing/2014/main" id="{1A1B6056-1159-4FC3-8561-8E7E5B83E51D}"/>
+              </a:ext>
+              <a:ext uri="{C183D7F6-B498-43B3-948B-1728B52AA6E4}">
+                <adec:decorative xmlns:adec="http://schemas.microsoft.com/office/drawing/2017/decorative" val="1"/>
+              </a:ext>
+            </a:extLst>
+          </p:cNvPr>
+          <p:cNvPicPr>
+            <a:picLocks noGrp="1" noRot="1" noChangeAspect="1" noMove="1" noResize="1" noEditPoints="1" noAdjustHandles="1" noChangeArrowheads="1" noChangeShapeType="1" noCrop="1"/>
+          </p:cNvPicPr>
+          <p:nvPr>
+            <p:extLst>
+              <p:ext uri="{386F3935-93C4-4BCD-93E2-E3B085C9AB24}">
+                <p16:designElem xmlns:p16="http://schemas.microsoft.com/office/powerpoint/2015/main" val="1"/>
+              </p:ext>
+            </p:extLst>
+          </p:nvPr>
+        </p:nvPicPr>
+        <p:blipFill>
+          <a:blip r:embed="rId4">
+            <a:alphaModFix/>
+            <a:extLst>
+              <a:ext uri="{28A0092B-C50C-407E-A947-70E740481C1C}">
+                <a14:useLocalDpi xmlns:a14="http://schemas.microsoft.com/office/drawing/2010/main" val="0"/>
+              </a:ext>
+            </a:extLst>
+          </a:blip>
+          <a:stretch>
+            <a:fillRect/>
+          </a:stretch>
+        </p:blipFill>
+        <p:spPr>
+          <a:xfrm>
+            <a:off x="0" y="0"/>
+            <a:ext cx="12189867" cy="6858000"/>
+          </a:xfrm>
+          <a:prstGeom prst="rect">
+            <a:avLst/>
+          </a:prstGeom>
+        </p:spPr>
+      </p:pic>
+      <p:sp>
+        <p:nvSpPr>
+          <p:cNvPr id="74" name="Rectangle 55">
+            <a:extLst>
+              <a:ext uri="{FF2B5EF4-FFF2-40B4-BE49-F238E27FC236}">
+                <a16:creationId xmlns:a16="http://schemas.microsoft.com/office/drawing/2014/main" id="{2BCD7CE8-C8D7-4B6C-8509-15892605FAB1}"/>
+              </a:ext>
+              <a:ext uri="{C183D7F6-B498-43B3-948B-1728B52AA6E4}">
+                <adec:decorative xmlns:adec="http://schemas.microsoft.com/office/drawing/2017/decorative" val="1"/>
+              </a:ext>
+            </a:extLst>
+          </p:cNvPr>
+          <p:cNvSpPr>
+            <a:spLocks noGrp="1" noRot="1" noChangeAspect="1" noMove="1" noResize="1" noEditPoints="1" noAdjustHandles="1" noChangeArrowheads="1" noChangeShapeType="1" noTextEdit="1"/>
+          </p:cNvSpPr>
+          <p:nvPr>
+            <p:extLst>
+              <p:ext uri="{386F3935-93C4-4BCD-93E2-E3B085C9AB24}">
+                <p16:designElem xmlns:p16="http://schemas.microsoft.com/office/powerpoint/2015/main" val="1"/>
+              </p:ext>
+            </p:extLst>
+          </p:nvPr>
+        </p:nvSpPr>
+        <p:spPr>
+          <a:xfrm>
+            <a:off x="0" y="0"/>
+            <a:ext cx="964174" cy="6858000"/>
+          </a:xfrm>
+          <a:prstGeom prst="rect">
+            <a:avLst/>
+          </a:prstGeom>
+          <a:solidFill>
+            <a:schemeClr val="bg2"/>
+          </a:solidFill>
+          <a:ln>
+            <a:noFill/>
+          </a:ln>
+        </p:spPr>
+        <p:style>
+          <a:lnRef idx="2">
+            <a:schemeClr val="accent1">
+              <a:shade val="50000"/>
+            </a:schemeClr>
+          </a:lnRef>
+          <a:fillRef idx="1">
+            <a:schemeClr val="accent1"/>
+          </a:fillRef>
+          <a:effectRef idx="0">
+            <a:schemeClr val="accent1"/>
+          </a:effectRef>
+          <a:fontRef idx="minor">
+            <a:schemeClr val="lt1"/>
+          </a:fontRef>
+        </p:style>
+        <p:txBody>
+          <a:bodyPr rtlCol="0" anchor="ctr"/>
+          <a:lstStyle/>
+          <a:p>
+            <a:pPr algn="ctr"/>
+            <a:endParaRPr lang="en-US"/>
+          </a:p>
+        </p:txBody>
+      </p:sp>
+      <p:sp>
+        <p:nvSpPr>
+          <p:cNvPr id="75" name="Rectangle 57">
+            <a:extLst>
+              <a:ext uri="{FF2B5EF4-FFF2-40B4-BE49-F238E27FC236}">
+                <a16:creationId xmlns:a16="http://schemas.microsoft.com/office/drawing/2014/main" id="{2280C4E4-90AE-48E6-9E01-4D4F7FBDB968}"/>
+              </a:ext>
+              <a:ext uri="{C183D7F6-B498-43B3-948B-1728B52AA6E4}">
+                <adec:decorative xmlns:adec="http://schemas.microsoft.com/office/drawing/2017/decorative" val="1"/>
+              </a:ext>
+            </a:extLst>
+          </p:cNvPr>
+          <p:cNvSpPr>
+            <a:spLocks noGrp="1" noRot="1" noChangeAspect="1" noMove="1" noResize="1" noEditPoints="1" noAdjustHandles="1" noChangeArrowheads="1" noChangeShapeType="1" noTextEdit="1"/>
+          </p:cNvSpPr>
+          <p:nvPr>
+            <p:extLst>
+              <p:ext uri="{386F3935-93C4-4BCD-93E2-E3B085C9AB24}">
+                <p16:designElem xmlns:p16="http://schemas.microsoft.com/office/powerpoint/2015/main" val="1"/>
+              </p:ext>
+            </p:extLst>
+          </p:nvPr>
+        </p:nvSpPr>
+        <p:spPr>
+          <a:xfrm>
+            <a:off x="962042" y="0"/>
+            <a:ext cx="45719" cy="6858000"/>
+          </a:xfrm>
+          <a:prstGeom prst="rect">
+            <a:avLst/>
+          </a:prstGeom>
+          <a:solidFill>
+            <a:schemeClr val="accent6"/>
+          </a:solidFill>
+          <a:ln>
+            <a:noFill/>
+          </a:ln>
+        </p:spPr>
+        <p:style>
+          <a:lnRef idx="2">
+            <a:schemeClr val="accent1">
+              <a:shade val="50000"/>
+            </a:schemeClr>
+          </a:lnRef>
+          <a:fillRef idx="1">
+            <a:schemeClr val="accent1"/>
+          </a:fillRef>
+          <a:effectRef idx="0">
+            <a:schemeClr val="accent1"/>
+          </a:effectRef>
+          <a:fontRef idx="minor">
+            <a:schemeClr val="lt1"/>
+          </a:fontRef>
+        </p:style>
+        <p:txBody>
+          <a:bodyPr rtlCol="0" anchor="ctr"/>
+          <a:lstStyle/>
+          <a:p>
+            <a:pPr algn="ctr"/>
+            <a:endParaRPr lang="en-US"/>
+          </a:p>
+        </p:txBody>
+      </p:sp>
+      <p:sp>
+        <p:nvSpPr>
+          <p:cNvPr id="76" name="Rectangle 59">
+            <a:extLst>
+              <a:ext uri="{FF2B5EF4-FFF2-40B4-BE49-F238E27FC236}">
+                <a16:creationId xmlns:a16="http://schemas.microsoft.com/office/drawing/2014/main" id="{876C1BA3-C0EA-4AEE-9B4C-8F66E6FC30F1}"/>
+              </a:ext>
+              <a:ext uri="{C183D7F6-B498-43B3-948B-1728B52AA6E4}">
+                <adec:decorative xmlns:adec="http://schemas.microsoft.com/office/drawing/2017/decorative" val="1"/>
+              </a:ext>
+            </a:extLst>
+          </p:cNvPr>
+          <p:cNvSpPr>
+            <a:spLocks noGrp="1" noRot="1" noChangeAspect="1" noMove="1" noResize="1" noEditPoints="1" noAdjustHandles="1" noChangeArrowheads="1" noChangeShapeType="1" noTextEdit="1"/>
+          </p:cNvSpPr>
+          <p:nvPr>
+            <p:extLst>
+              <p:ext uri="{386F3935-93C4-4BCD-93E2-E3B085C9AB24}">
+                <p16:designElem xmlns:p16="http://schemas.microsoft.com/office/powerpoint/2015/main" val="1"/>
+              </p:ext>
+            </p:extLst>
+          </p:nvPr>
+        </p:nvSpPr>
+        <p:spPr>
+          <a:xfrm>
+            <a:off x="1007533" y="0"/>
+            <a:ext cx="10378001" cy="6858000"/>
+          </a:xfrm>
+          <a:prstGeom prst="rect">
+            <a:avLst/>
+          </a:prstGeom>
+          <a:solidFill>
+            <a:schemeClr val="bg2">
+              <a:alpha val="92000"/>
+            </a:schemeClr>
+          </a:solidFill>
+          <a:ln>
+            <a:noFill/>
+          </a:ln>
+        </p:spPr>
+        <p:style>
+          <a:lnRef idx="2">
+            <a:schemeClr val="accent1">
+              <a:shade val="50000"/>
+            </a:schemeClr>
+          </a:lnRef>
+          <a:fillRef idx="1">
+            <a:schemeClr val="accent1"/>
+          </a:fillRef>
+          <a:effectRef idx="0">
+            <a:schemeClr val="accent1"/>
+          </a:effectRef>
+          <a:fontRef idx="minor">
+            <a:schemeClr val="lt1"/>
+          </a:fontRef>
+        </p:style>
+        <p:txBody>
+          <a:bodyPr rtlCol="0" anchor="ctr"/>
+          <a:lstStyle/>
+          <a:p>
+            <a:pPr algn="ctr"/>
+            <a:endParaRPr lang="en-US"/>
+          </a:p>
+        </p:txBody>
+      </p:sp>
       <p:sp>
         <p:nvSpPr>
           <p:cNvPr id="2" name="Title 1">
@@ -8761,14 +10385,268 @@
             <p:ph type="title"/>
           </p:nvPr>
         </p:nvSpPr>
+        <p:spPr>
+          <a:xfrm>
+            <a:off x="6853090" y="906735"/>
+            <a:ext cx="3279886" cy="2268559"/>
+          </a:xfrm>
+        </p:spPr>
+        <p:txBody>
+          <a:bodyPr vert="horz" lIns="91440" tIns="45720" rIns="91440" bIns="45720" rtlCol="0" anchor="t">
+            <a:normAutofit/>
+          </a:bodyPr>
+          <a:lstStyle/>
+          <a:p>
+            <a:r>
+              <a:rPr lang="en-US" sz="3600" dirty="0"/>
+              <a:t>Dispensary Saturation and Drug Crimes</a:t>
+            </a:r>
+          </a:p>
+        </p:txBody>
+      </p:sp>
+      <p:pic>
+        <p:nvPicPr>
+          <p:cNvPr id="14" name="Content Placeholder 8" descr="A screenshot of a cell phone&#10;&#10;Description automatically generated">
+            <a:extLst>
+              <a:ext uri="{FF2B5EF4-FFF2-40B4-BE49-F238E27FC236}">
+                <a16:creationId xmlns:a16="http://schemas.microsoft.com/office/drawing/2014/main" id="{DD16A1D0-153A-834D-A025-E5C808B9FE1A}"/>
+              </a:ext>
+            </a:extLst>
+          </p:cNvPr>
+          <p:cNvPicPr>
+            <a:picLocks noChangeAspect="1"/>
+          </p:cNvPicPr>
+          <p:nvPr/>
+        </p:nvPicPr>
+        <p:blipFill>
+          <a:blip r:embed="rId5"/>
+          <a:stretch>
+            <a:fillRect/>
+          </a:stretch>
+        </p:blipFill>
+        <p:spPr>
+          <a:xfrm>
+            <a:off x="1409275" y="906735"/>
+            <a:ext cx="3996158" cy="4709758"/>
+          </a:xfrm>
+          <a:prstGeom prst="rect">
+            <a:avLst/>
+          </a:prstGeom>
+          <a:ln>
+            <a:gradFill flip="none" rotWithShape="1">
+              <a:gsLst>
+                <a:gs pos="86000">
+                  <a:schemeClr val="accent6">
+                    <a:lumMod val="67000"/>
+                  </a:schemeClr>
+                </a:gs>
+                <a:gs pos="20000">
+                  <a:schemeClr val="accent6">
+                    <a:lumMod val="97000"/>
+                    <a:lumOff val="3000"/>
+                  </a:schemeClr>
+                </a:gs>
+                <a:gs pos="100000">
+                  <a:schemeClr val="accent6">
+                    <a:lumMod val="60000"/>
+                    <a:lumOff val="40000"/>
+                  </a:schemeClr>
+                </a:gs>
+              </a:gsLst>
+              <a:lin ang="16200000" scaled="1"/>
+              <a:tileRect/>
+            </a:gradFill>
+          </a:ln>
+          <a:effectLst>
+            <a:innerShdw blurRad="127000">
+              <a:prstClr val="black">
+                <a:alpha val="90000"/>
+              </a:prstClr>
+            </a:innerShdw>
+          </a:effectLst>
+        </p:spPr>
+      </p:pic>
+      <p:pic>
+        <p:nvPicPr>
+          <p:cNvPr id="11" name="Picture 10" descr="A close up of a map&#10;&#10;Description automatically generated">
+            <a:extLst>
+              <a:ext uri="{FF2B5EF4-FFF2-40B4-BE49-F238E27FC236}">
+                <a16:creationId xmlns:a16="http://schemas.microsoft.com/office/drawing/2014/main" id="{675B02C4-9C1A-B349-9B6D-0C01237302A0}"/>
+              </a:ext>
+            </a:extLst>
+          </p:cNvPr>
+          <p:cNvPicPr>
+            <a:picLocks noChangeAspect="1"/>
+          </p:cNvPicPr>
+          <p:nvPr/>
+        </p:nvPicPr>
+        <p:blipFill>
+          <a:blip r:embed="rId6"/>
+          <a:stretch>
+            <a:fillRect/>
+          </a:stretch>
+        </p:blipFill>
+        <p:spPr>
+          <a:xfrm>
+            <a:off x="6180202" y="3592917"/>
+            <a:ext cx="3826412" cy="2618557"/>
+          </a:xfrm>
+          <a:prstGeom prst="rect">
+            <a:avLst/>
+          </a:prstGeom>
+          <a:ln>
+            <a:gradFill flip="none" rotWithShape="1">
+              <a:gsLst>
+                <a:gs pos="86000">
+                  <a:schemeClr val="accent6">
+                    <a:lumMod val="67000"/>
+                  </a:schemeClr>
+                </a:gs>
+                <a:gs pos="20000">
+                  <a:schemeClr val="accent6">
+                    <a:lumMod val="97000"/>
+                    <a:lumOff val="3000"/>
+                  </a:schemeClr>
+                </a:gs>
+                <a:gs pos="100000">
+                  <a:schemeClr val="accent6">
+                    <a:lumMod val="60000"/>
+                    <a:lumOff val="40000"/>
+                  </a:schemeClr>
+                </a:gs>
+              </a:gsLst>
+              <a:lin ang="16200000" scaled="1"/>
+              <a:tileRect/>
+            </a:gradFill>
+          </a:ln>
+          <a:effectLst>
+            <a:innerShdw blurRad="127000">
+              <a:prstClr val="black">
+                <a:alpha val="90000"/>
+              </a:prstClr>
+            </a:innerShdw>
+          </a:effectLst>
+        </p:spPr>
+      </p:pic>
+      <p:sp>
+        <p:nvSpPr>
+          <p:cNvPr id="77" name="Rectangle 61">
+            <a:extLst>
+              <a:ext uri="{FF2B5EF4-FFF2-40B4-BE49-F238E27FC236}">
+                <a16:creationId xmlns:a16="http://schemas.microsoft.com/office/drawing/2014/main" id="{16BCFD5C-CD97-4975-8BA8-D6A4A5D0CAB2}"/>
+              </a:ext>
+              <a:ext uri="{C183D7F6-B498-43B3-948B-1728B52AA6E4}">
+                <adec:decorative xmlns:adec="http://schemas.microsoft.com/office/drawing/2017/decorative" val="1"/>
+              </a:ext>
+            </a:extLst>
+          </p:cNvPr>
+          <p:cNvSpPr>
+            <a:spLocks noGrp="1" noRot="1" noChangeAspect="1" noMove="1" noResize="1" noEditPoints="1" noAdjustHandles="1" noChangeArrowheads="1" noChangeShapeType="1" noTextEdit="1"/>
+          </p:cNvSpPr>
+          <p:nvPr>
+            <p:extLst>
+              <p:ext uri="{386F3935-93C4-4BCD-93E2-E3B085C9AB24}">
+                <p16:designElem xmlns:p16="http://schemas.microsoft.com/office/powerpoint/2015/main" val="1"/>
+              </p:ext>
+            </p:extLst>
+          </p:nvPr>
+        </p:nvSpPr>
+        <p:spPr>
+          <a:xfrm>
+            <a:off x="11387666" y="-2718"/>
+            <a:ext cx="27432" cy="6858000"/>
+          </a:xfrm>
+          <a:prstGeom prst="rect">
+            <a:avLst/>
+          </a:prstGeom>
+          <a:solidFill>
+            <a:schemeClr val="accent6"/>
+          </a:solidFill>
+          <a:ln>
+            <a:noFill/>
+          </a:ln>
+        </p:spPr>
+        <p:style>
+          <a:lnRef idx="2">
+            <a:schemeClr val="accent1">
+              <a:shade val="50000"/>
+            </a:schemeClr>
+          </a:lnRef>
+          <a:fillRef idx="1">
+            <a:schemeClr val="accent1"/>
+          </a:fillRef>
+          <a:effectRef idx="0">
+            <a:schemeClr val="accent1"/>
+          </a:effectRef>
+          <a:fontRef idx="minor">
+            <a:schemeClr val="lt1"/>
+          </a:fontRef>
+        </p:style>
+        <p:txBody>
+          <a:bodyPr rtlCol="0" anchor="ctr"/>
+          <a:lstStyle/>
+          <a:p>
+            <a:pPr algn="ctr"/>
+            <a:endParaRPr lang="en-US"/>
+          </a:p>
+        </p:txBody>
+      </p:sp>
+    </p:spTree>
+    <p:extLst>
+      <p:ext uri="{BB962C8B-B14F-4D97-AF65-F5344CB8AC3E}">
+        <p14:creationId xmlns:p14="http://schemas.microsoft.com/office/powerpoint/2010/main" val="2822640524"/>
+      </p:ext>
+    </p:extLst>
+  </p:cSld>
+  <p:clrMapOvr>
+    <a:masterClrMapping/>
+  </p:clrMapOvr>
+</p:sld>
+</file>
+
+<file path=ppt/slides/slide8.xml><?xml version="1.0" encoding="utf-8"?>
+<p:sld xmlns:a="http://schemas.openxmlformats.org/drawingml/2006/main" xmlns:r="http://schemas.openxmlformats.org/officeDocument/2006/relationships" xmlns:p="http://schemas.openxmlformats.org/presentationml/2006/main">
+  <p:cSld>
+    <p:spTree>
+      <p:nvGrpSpPr>
+        <p:cNvPr id="1" name=""/>
+        <p:cNvGrpSpPr/>
+        <p:nvPr/>
+      </p:nvGrpSpPr>
+      <p:grpSpPr>
+        <a:xfrm>
+          <a:off x="0" y="0"/>
+          <a:ext cx="0" cy="0"/>
+          <a:chOff x="0" y="0"/>
+          <a:chExt cx="0" cy="0"/>
+        </a:xfrm>
+      </p:grpSpPr>
+      <p:sp>
+        <p:nvSpPr>
+          <p:cNvPr id="2" name="Title 1">
+            <a:extLst>
+              <a:ext uri="{FF2B5EF4-FFF2-40B4-BE49-F238E27FC236}">
+                <a16:creationId xmlns:a16="http://schemas.microsoft.com/office/drawing/2014/main" id="{69D0FFB3-CDB9-4E4C-9361-1E09F6C7F499}"/>
+              </a:ext>
+            </a:extLst>
+          </p:cNvPr>
+          <p:cNvSpPr>
+            <a:spLocks noGrp="1"/>
+          </p:cNvSpPr>
+          <p:nvPr>
+            <p:ph type="title"/>
+          </p:nvPr>
+        </p:nvSpPr>
         <p:spPr/>
         <p:txBody>
           <a:bodyPr/>
           <a:lstStyle/>
           <a:p>
             <a:r>
-              <a:rPr lang="en-US" dirty="0"/>
-              <a:t>Dispensary Saturation and Drug Crimes</a:t>
+              <a:rPr lang="en-US" dirty="0">
+                <a:latin typeface="Calisto MT" panose="02040603050505030304" pitchFamily="18" charset="77"/>
+              </a:rPr>
+              <a:t>Next Steps</a:t>
             </a:r>
           </a:p>
         </p:txBody>
@@ -8778,7 +10656,7 @@
           <p:cNvPr id="3" name="Content Placeholder 2">
             <a:extLst>
               <a:ext uri="{FF2B5EF4-FFF2-40B4-BE49-F238E27FC236}">
-                <a16:creationId xmlns:a16="http://schemas.microsoft.com/office/drawing/2014/main" id="{001D263C-DA37-9F4B-ACCE-0C0B9583E2EF}"/>
+                <a16:creationId xmlns:a16="http://schemas.microsoft.com/office/drawing/2014/main" id="{81709D62-9579-104A-B22A-7038781AB919}"/>
               </a:ext>
             </a:extLst>
           </p:cNvPr>
@@ -8791,17 +10669,74 @@
         </p:nvSpPr>
         <p:spPr/>
         <p:txBody>
-          <a:bodyPr/>
+          <a:bodyPr>
+            <a:normAutofit/>
+          </a:bodyPr>
           <a:lstStyle/>
           <a:p>
-            <a:endParaRPr lang="en-US" dirty="0"/>
+            <a:r>
+              <a:rPr lang="en-US" dirty="0">
+                <a:latin typeface="Calisto MT" panose="02040603050505030304" pitchFamily="18" charset="77"/>
+              </a:rPr>
+              <a:t>Our analysis was focused on the Denver area, and fairly limited in scope</a:t>
+            </a:r>
+          </a:p>
+          <a:p>
+            <a:r>
+              <a:rPr lang="en-US" dirty="0">
+                <a:latin typeface="Calisto MT" panose="02040603050505030304" pitchFamily="18" charset="77"/>
+              </a:rPr>
+              <a:t>Next steps could include:</a:t>
+            </a:r>
+          </a:p>
+          <a:p>
+            <a:pPr lvl="1"/>
+            <a:r>
+              <a:rPr lang="en-US" dirty="0">
+                <a:latin typeface="Calisto MT" panose="02040603050505030304" pitchFamily="18" charset="77"/>
+              </a:rPr>
+              <a:t>Analysis of Colorado crime pre/post legalization</a:t>
+            </a:r>
+          </a:p>
+          <a:p>
+            <a:pPr lvl="1"/>
+            <a:r>
+              <a:rPr lang="en-US" dirty="0">
+                <a:latin typeface="Calisto MT" panose="02040603050505030304" pitchFamily="18" charset="77"/>
+              </a:rPr>
+              <a:t>Comparison of crime rate increase/decrease in urban v. rural areas</a:t>
+            </a:r>
+          </a:p>
+          <a:p>
+            <a:pPr lvl="1"/>
+            <a:r>
+              <a:rPr lang="en-US" dirty="0">
+                <a:latin typeface="Calisto MT" panose="02040603050505030304" pitchFamily="18" charset="77"/>
+              </a:rPr>
+              <a:t>Comparison of all recreational states’ crime pre/post legalization</a:t>
+            </a:r>
+          </a:p>
+          <a:p>
+            <a:pPr lvl="1"/>
+            <a:r>
+              <a:rPr lang="en-US" dirty="0">
+                <a:latin typeface="Calisto MT" panose="02040603050505030304" pitchFamily="18" charset="77"/>
+              </a:rPr>
+              <a:t>US states’ crime movement against crime movement in provinces of other recreationally legal countries (e.g. Canada)</a:t>
+            </a:r>
+          </a:p>
+          <a:p>
+            <a:pPr lvl="1"/>
+            <a:endParaRPr lang="en-US" dirty="0">
+              <a:latin typeface="Calisto MT" panose="02040603050505030304" pitchFamily="18" charset="77"/>
+            </a:endParaRPr>
           </a:p>
         </p:txBody>
       </p:sp>
     </p:spTree>
     <p:extLst>
       <p:ext uri="{BB962C8B-B14F-4D97-AF65-F5344CB8AC3E}">
-        <p14:creationId xmlns:p14="http://schemas.microsoft.com/office/powerpoint/2010/main" val="2822640524"/>
+        <p14:creationId xmlns:p14="http://schemas.microsoft.com/office/powerpoint/2010/main" val="1120249626"/>
       </p:ext>
     </p:extLst>
   </p:cSld>

</xml_diff>